<commit_message>
cấu trúc lại project
</commit_message>
<xml_diff>
--- a/Silde Bao cao/Tuần 1.pptx
+++ b/Silde Bao cao/Tuần 1.pptx
@@ -5,7 +5,7 @@
     <p:sldMasterId id="2147483659" r:id="rId1"/>
   </p:sldMasterIdLst>
   <p:notesMasterIdLst>
-    <p:notesMasterId r:id="rId17"/>
+    <p:notesMasterId r:id="rId19"/>
   </p:notesMasterIdLst>
   <p:sldIdLst>
     <p:sldId id="256" r:id="rId2"/>
@@ -22,26 +22,28 @@
     <p:sldId id="262" r:id="rId13"/>
     <p:sldId id="263" r:id="rId14"/>
     <p:sldId id="264" r:id="rId15"/>
-    <p:sldId id="265" r:id="rId16"/>
+    <p:sldId id="272" r:id="rId16"/>
+    <p:sldId id="265" r:id="rId17"/>
+    <p:sldId id="271" r:id="rId18"/>
   </p:sldIdLst>
   <p:sldSz cx="9144000" cy="5143500" type="screen16x9"/>
   <p:notesSz cx="6858000" cy="9144000"/>
   <p:embeddedFontLst>
     <p:embeddedFont>
       <p:font typeface="Cambria Math" panose="02040503050406030204" pitchFamily="18" charset="0"/>
-      <p:regular r:id="rId18"/>
+      <p:regular r:id="rId20"/>
     </p:embeddedFont>
     <p:embeddedFont>
       <p:font typeface="Maven Pro" panose="020B0604020202020204" charset="0"/>
-      <p:regular r:id="rId19"/>
-      <p:bold r:id="rId20"/>
+      <p:regular r:id="rId21"/>
+      <p:bold r:id="rId22"/>
     </p:embeddedFont>
     <p:embeddedFont>
       <p:font typeface="Nunito" panose="020B0604020202020204" charset="0"/>
-      <p:regular r:id="rId21"/>
-      <p:bold r:id="rId22"/>
-      <p:italic r:id="rId23"/>
-      <p:boldItalic r:id="rId24"/>
+      <p:regular r:id="rId23"/>
+      <p:bold r:id="rId24"/>
+      <p:italic r:id="rId25"/>
+      <p:boldItalic r:id="rId26"/>
     </p:embeddedFont>
   </p:embeddedFontLst>
   <p:defaultTextStyle>
@@ -866,7 +868,7 @@
         </p:nvSpPr>
         <p:spPr>
           <a:xfrm>
-            <a:off x="381300" y="685800"/>
+            <a:off x="381000" y="685800"/>
             <a:ext cx="6096000" cy="3429000"/>
           </a:xfrm>
           <a:custGeom>
@@ -15810,8 +15812,8 @@
           </a:p>
         </p:txBody>
       </p:sp>
-      <mc:AlternateContent xmlns:mc="http://schemas.openxmlformats.org/markup-compatibility/2006">
-        <mc:Choice xmlns:a14="http://schemas.microsoft.com/office/drawing/2010/main" Requires="a14">
+      <mc:AlternateContent xmlns:mc="http://schemas.openxmlformats.org/markup-compatibility/2006" xmlns:a14="http://schemas.microsoft.com/office/drawing/2010/main">
+        <mc:Choice Requires="a14">
           <p:sp>
             <p:nvSpPr>
               <p:cNvPr id="308" name="Google Shape;308;p18"/>
@@ -16457,7 +16459,7 @@
                             <a:highlight>
                               <a:srgbClr val="FFFFFF"/>
                             </a:highlight>
-                            <a:latin typeface="+mn-lt"/>
+                            <a:latin typeface="Cambria Math" panose="02040503050406030204" pitchFamily="18" charset="0"/>
                           </a:rPr>
                         </m:ctrlPr>
                       </m:sSubPr>
@@ -16467,7 +16469,7 @@
                             <a:highlight>
                               <a:srgbClr val="FFFFFF"/>
                             </a:highlight>
-                            <a:latin typeface="+mn-lt"/>
+                            <a:latin typeface="Cambria Math" panose="02040503050406030204" pitchFamily="18" charset="0"/>
                           </a:rPr>
                           <m:t>𝑥</m:t>
                         </m:r>
@@ -16478,7 +16480,7 @@
                             <a:highlight>
                               <a:srgbClr val="FFFFFF"/>
                             </a:highlight>
-                            <a:latin typeface="+mn-lt"/>
+                            <a:latin typeface="Cambria Math" panose="02040503050406030204" pitchFamily="18" charset="0"/>
                           </a:rPr>
                           <m:t>𝑡</m:t>
                         </m:r>
@@ -16511,7 +16513,7 @@
                         <a:highlight>
                           <a:srgbClr val="FFFFFF"/>
                         </a:highlight>
-                        <a:latin typeface="+mn-lt"/>
+                        <a:latin typeface="Cambria Math" panose="02040503050406030204" pitchFamily="18" charset="0"/>
                         <a:ea typeface="Arial"/>
                         <a:cs typeface="Arial"/>
                         <a:sym typeface="Arial"/>
@@ -16526,7 +16528,7 @@
                         <a:highlight>
                           <a:srgbClr val="FFFFFF"/>
                         </a:highlight>
-                        <a:latin typeface="+mn-lt"/>
+                        <a:latin typeface="Cambria Math" panose="02040503050406030204" pitchFamily="18" charset="0"/>
                         <a:ea typeface="Arial"/>
                         <a:cs typeface="Arial"/>
                         <a:sym typeface="Arial"/>
@@ -16541,7 +16543,7 @@
                         <a:highlight>
                           <a:srgbClr val="FFFFFF"/>
                         </a:highlight>
-                        <a:latin typeface="+mn-lt"/>
+                        <a:latin typeface="Cambria Math" panose="02040503050406030204" pitchFamily="18" charset="0"/>
                         <a:ea typeface="Cambria Math" panose="02040503050406030204" pitchFamily="18" charset="0"/>
                         <a:cs typeface="Arial"/>
                         <a:sym typeface="Arial"/>
@@ -16556,7 +16558,7 @@
                         <a:highlight>
                           <a:srgbClr val="FFFFFF"/>
                         </a:highlight>
-                        <a:latin typeface="+mn-lt"/>
+                        <a:latin typeface="Cambria Math" panose="02040503050406030204" pitchFamily="18" charset="0"/>
                         <a:ea typeface="Cambria Math" panose="02040503050406030204" pitchFamily="18" charset="0"/>
                         <a:cs typeface="Arial"/>
                         <a:sym typeface="Arial"/>
@@ -16575,7 +16577,7 @@
                             <a:highlight>
                               <a:srgbClr val="FFFFFF"/>
                             </a:highlight>
-                            <a:latin typeface="+mn-lt"/>
+                            <a:latin typeface="Cambria Math" panose="02040503050406030204" pitchFamily="18" charset="0"/>
                             <a:ea typeface="Cambria Math" panose="02040503050406030204" pitchFamily="18" charset="0"/>
                             <a:cs typeface="Arial"/>
                             <a:sym typeface="Arial"/>
@@ -16591,7 +16593,7 @@
                             <a:highlight>
                               <a:srgbClr val="FFFFFF"/>
                             </a:highlight>
-                            <a:latin typeface="+mn-lt"/>
+                            <a:latin typeface="Cambria Math" panose="02040503050406030204" pitchFamily="18" charset="0"/>
                             <a:ea typeface="Cambria Math" panose="02040503050406030204" pitchFamily="18" charset="0"/>
                             <a:cs typeface="Arial"/>
                             <a:sym typeface="Arial"/>
@@ -16657,7 +16659,7 @@
                         <a:highlight>
                           <a:srgbClr val="FFFFFF"/>
                         </a:highlight>
-                        <a:latin typeface="+mn-lt"/>
+                        <a:latin typeface="Cambria Math" panose="02040503050406030204" pitchFamily="18" charset="0"/>
                         <a:ea typeface="Arial"/>
                         <a:cs typeface="Arial"/>
                         <a:sym typeface="Arial"/>
@@ -16961,7 +16963,7 @@
                         <a:highlight>
                           <a:srgbClr val="FFFFFF"/>
                         </a:highlight>
-                        <a:latin typeface="+mn-lt"/>
+                        <a:latin typeface="Cambria Math" panose="02040503050406030204" pitchFamily="18" charset="0"/>
                         <a:ea typeface="Arial"/>
                         <a:cs typeface="Arial"/>
                         <a:sym typeface="Arial"/>
@@ -16976,7 +16978,7 @@
                         <a:highlight>
                           <a:srgbClr val="FFFFFF"/>
                         </a:highlight>
-                        <a:latin typeface="+mn-lt"/>
+                        <a:latin typeface="Cambria Math" panose="02040503050406030204" pitchFamily="18" charset="0"/>
                         <a:ea typeface="Arial"/>
                         <a:cs typeface="Arial"/>
                         <a:sym typeface="Arial"/>
@@ -16990,7 +16992,7 @@
                             <a:highlight>
                               <a:srgbClr val="FFFFFF"/>
                             </a:highlight>
-                            <a:latin typeface="+mn-lt"/>
+                            <a:latin typeface="Cambria Math" panose="02040503050406030204" pitchFamily="18" charset="0"/>
                           </a:rPr>
                         </m:ctrlPr>
                       </m:sSubPr>
@@ -17000,7 +17002,7 @@
                             <a:highlight>
                               <a:srgbClr val="FFFFFF"/>
                             </a:highlight>
-                            <a:latin typeface="+mn-lt"/>
+                            <a:latin typeface="Cambria Math" panose="02040503050406030204" pitchFamily="18" charset="0"/>
                           </a:rPr>
                           <m:t>𝑥</m:t>
                         </m:r>
@@ -17011,7 +17013,7 @@
                             <a:highlight>
                               <a:srgbClr val="FFFFFF"/>
                             </a:highlight>
-                            <a:latin typeface="+mn-lt"/>
+                            <a:latin typeface="Cambria Math" panose="02040503050406030204" pitchFamily="18" charset="0"/>
                           </a:rPr>
                           <m:t>𝑡</m:t>
                         </m:r>
@@ -17647,7 +17649,7 @@
             </p:txBody>
           </p:sp>
         </mc:Choice>
-        <mc:Fallback>
+        <mc:Fallback xmlns="">
           <p:sp>
             <p:nvSpPr>
               <p:cNvPr id="308" name="Google Shape;308;p18"/>
@@ -17741,8 +17743,8 @@
           </a:p>
         </p:txBody>
       </p:sp>
-      <mc:AlternateContent xmlns:mc="http://schemas.openxmlformats.org/markup-compatibility/2006">
-        <mc:Choice xmlns:a14="http://schemas.microsoft.com/office/drawing/2010/main" Requires="a14">
+      <mc:AlternateContent xmlns:mc="http://schemas.openxmlformats.org/markup-compatibility/2006" xmlns:a14="http://schemas.microsoft.com/office/drawing/2010/main">
+        <mc:Choice Requires="a14">
           <p:sp>
             <p:nvSpPr>
               <p:cNvPr id="3" name="Text Placeholder 2">
@@ -17983,7 +17985,7 @@
             </p:txBody>
           </p:sp>
         </mc:Choice>
-        <mc:Fallback>
+        <mc:Fallback xmlns="">
           <p:sp>
             <p:nvSpPr>
               <p:cNvPr id="3" name="Text Placeholder 2">
@@ -18125,8 +18127,8 @@
           </a:p>
         </p:txBody>
       </p:sp>
-      <mc:AlternateContent xmlns:mc="http://schemas.openxmlformats.org/markup-compatibility/2006">
-        <mc:Choice xmlns:a14="http://schemas.microsoft.com/office/drawing/2010/main" Requires="a14">
+      <mc:AlternateContent xmlns:mc="http://schemas.openxmlformats.org/markup-compatibility/2006" xmlns:a14="http://schemas.microsoft.com/office/drawing/2010/main">
+        <mc:Choice Requires="a14">
           <p:sp>
             <p:nvSpPr>
               <p:cNvPr id="314" name="Google Shape;314;p19"/>
@@ -18544,7 +18546,7 @@
             </p:txBody>
           </p:sp>
         </mc:Choice>
-        <mc:Fallback>
+        <mc:Fallback xmlns="">
           <p:sp>
             <p:nvSpPr>
               <p:cNvPr id="314" name="Google Shape;314;p19"/>
@@ -18640,12 +18642,24 @@
               <a:rPr lang="vi" dirty="0"/>
               <a:t>Possible World</a:t>
             </a:r>
+            <a:r>
+              <a:rPr lang="en-US" dirty="0"/>
+              <a:t> (</a:t>
+            </a:r>
+            <a:r>
+              <a:rPr lang="en-US" dirty="0" err="1"/>
+              <a:t>tt</a:t>
+            </a:r>
+            <a:r>
+              <a:rPr lang="en-US" dirty="0"/>
+              <a:t>)</a:t>
+            </a:r>
             <a:endParaRPr dirty="0"/>
           </a:p>
         </p:txBody>
       </p:sp>
-      <mc:AlternateContent xmlns:mc="http://schemas.openxmlformats.org/markup-compatibility/2006">
-        <mc:Choice xmlns:a14="http://schemas.microsoft.com/office/drawing/2010/main" Requires="a14">
+      <mc:AlternateContent xmlns:mc="http://schemas.openxmlformats.org/markup-compatibility/2006" xmlns:a14="http://schemas.microsoft.com/office/drawing/2010/main">
+        <mc:Choice Requires="a14">
           <p:sp>
             <p:nvSpPr>
               <p:cNvPr id="320" name="Google Shape;320;p20"/>
@@ -19004,7 +19018,14 @@
                               <a:latin typeface="Cambria Math" panose="02040503050406030204" pitchFamily="18" charset="0"/>
                               <a:ea typeface="Cambria Math" panose="02040503050406030204" pitchFamily="18" charset="0"/>
                             </a:rPr>
-                            <m:t>, </m:t>
+                            <m:t>,</m:t>
+                          </m:r>
+                          <m:r>
+                            <a:rPr lang="en-US" sz="1600" b="0" i="1" smtClean="0">
+                              <a:latin typeface="Cambria Math" panose="02040503050406030204" pitchFamily="18" charset="0"/>
+                              <a:ea typeface="Cambria Math" panose="02040503050406030204" pitchFamily="18" charset="0"/>
+                            </a:rPr>
+                            <m:t> </m:t>
                           </m:r>
                           <m:sSub>
                             <m:sSubPr>
@@ -19278,7 +19299,7 @@
             </p:txBody>
           </p:sp>
         </mc:Choice>
-        <mc:Fallback>
+        <mc:Fallback xmlns="">
           <p:sp>
             <p:nvSpPr>
               <p:cNvPr id="320" name="Google Shape;320;p20"/>
@@ -19463,6 +19484,582 @@
   <p:cSld>
     <p:spTree>
       <p:nvGrpSpPr>
+        <p:cNvPr id="1" name=""/>
+        <p:cNvGrpSpPr/>
+        <p:nvPr/>
+      </p:nvGrpSpPr>
+      <p:grpSpPr>
+        <a:xfrm>
+          <a:off x="0" y="0"/>
+          <a:ext cx="0" cy="0"/>
+          <a:chOff x="0" y="0"/>
+          <a:chExt cx="0" cy="0"/>
+        </a:xfrm>
+      </p:grpSpPr>
+      <p:sp>
+        <p:nvSpPr>
+          <p:cNvPr id="2" name="Title 1">
+            <a:extLst>
+              <a:ext uri="{FF2B5EF4-FFF2-40B4-BE49-F238E27FC236}">
+                <a16:creationId xmlns:a16="http://schemas.microsoft.com/office/drawing/2014/main" id="{88809038-6ACE-47DB-9166-EFB905CAF431}"/>
+              </a:ext>
+            </a:extLst>
+          </p:cNvPr>
+          <p:cNvSpPr>
+            <a:spLocks noGrp="1"/>
+          </p:cNvSpPr>
+          <p:nvPr>
+            <p:ph type="title"/>
+          </p:nvPr>
+        </p:nvSpPr>
+        <p:spPr/>
+        <p:txBody>
+          <a:bodyPr/>
+          <a:lstStyle/>
+          <a:p>
+            <a:r>
+              <a:rPr lang="vi" dirty="0"/>
+              <a:t>Possible World</a:t>
+            </a:r>
+            <a:r>
+              <a:rPr lang="en-US" dirty="0"/>
+              <a:t> (</a:t>
+            </a:r>
+            <a:r>
+              <a:rPr lang="en-US" dirty="0" err="1"/>
+              <a:t>tt</a:t>
+            </a:r>
+            <a:r>
+              <a:rPr lang="en-US" dirty="0"/>
+              <a:t>)</a:t>
+            </a:r>
+          </a:p>
+        </p:txBody>
+      </p:sp>
+      <mc:AlternateContent xmlns:mc="http://schemas.openxmlformats.org/markup-compatibility/2006">
+        <mc:Choice xmlns:a14="http://schemas.microsoft.com/office/drawing/2010/main" Requires="a14">
+          <p:sp>
+            <p:nvSpPr>
+              <p:cNvPr id="3" name="Text Placeholder 2">
+                <a:extLst>
+                  <a:ext uri="{FF2B5EF4-FFF2-40B4-BE49-F238E27FC236}">
+                    <a16:creationId xmlns:a16="http://schemas.microsoft.com/office/drawing/2014/main" id="{A71A36F2-7744-417A-9062-D2DAFFD98645}"/>
+                  </a:ext>
+                </a:extLst>
+              </p:cNvPr>
+              <p:cNvSpPr>
+                <a:spLocks noGrp="1"/>
+              </p:cNvSpPr>
+              <p:nvPr>
+                <p:ph type="body" idx="1"/>
+              </p:nvPr>
+            </p:nvSpPr>
+            <p:spPr/>
+            <p:txBody>
+              <a:bodyPr>
+                <a:normAutofit/>
+              </a:bodyPr>
+              <a:lstStyle/>
+              <a:p>
+                <a:r>
+                  <a:rPr lang="en-US" sz="1600" dirty="0"/>
+                  <a:t>Số </a:t>
+                </a:r>
+                <a:r>
+                  <a:rPr lang="en-US" sz="1600" dirty="0" err="1"/>
+                  <a:t>phần</a:t>
+                </a:r>
+                <a:r>
+                  <a:rPr lang="en-US" sz="1600" dirty="0"/>
+                  <a:t> </a:t>
+                </a:r>
+                <a:r>
+                  <a:rPr lang="en-US" sz="1600" dirty="0" err="1"/>
+                  <a:t>tử</a:t>
+                </a:r>
+                <a:r>
+                  <a:rPr lang="en-US" sz="1600" dirty="0"/>
+                  <a:t> </a:t>
+                </a:r>
+                <a:r>
+                  <a:rPr lang="en-US" sz="1600" dirty="0" err="1"/>
+                  <a:t>của</a:t>
+                </a:r>
+                <a:r>
+                  <a:rPr lang="en-US" sz="1600" dirty="0"/>
+                  <a:t> PW </a:t>
+                </a:r>
+                <a:r>
+                  <a:rPr lang="en-US" sz="1600" dirty="0" err="1"/>
+                  <a:t>theo</a:t>
+                </a:r>
+                <a:r>
+                  <a:rPr lang="en-US" sz="1600" dirty="0"/>
+                  <a:t> </a:t>
+                </a:r>
+                <a:r>
+                  <a:rPr lang="en-US" sz="1600" dirty="0" err="1"/>
+                  <a:t>công</a:t>
+                </a:r>
+                <a:r>
+                  <a:rPr lang="en-US" sz="1600" dirty="0"/>
+                  <a:t> </a:t>
+                </a:r>
+                <a:r>
+                  <a:rPr lang="en-US" sz="1600" dirty="0" err="1"/>
+                  <a:t>thức</a:t>
+                </a:r>
+                <a:r>
+                  <a:rPr lang="en-US" sz="1600" dirty="0"/>
+                  <a:t> </a:t>
+                </a:r>
+                <a:r>
+                  <a:rPr lang="en-US" sz="1600" dirty="0" err="1"/>
+                  <a:t>sau</a:t>
+                </a:r>
+                <a:r>
+                  <a:rPr lang="en-US" sz="1600" dirty="0"/>
+                  <a:t>:</a:t>
+                </a:r>
+              </a:p>
+              <a:p>
+                <a:endParaRPr lang="en-US" sz="1600" dirty="0"/>
+              </a:p>
+              <a:p>
+                <a:pPr marL="146050" indent="0">
+                  <a:buNone/>
+                </a:pPr>
+                <a14:m>
+                  <m:oMathPara xmlns:m="http://schemas.openxmlformats.org/officeDocument/2006/math">
+                    <m:oMathParaPr>
+                      <m:jc m:val="centerGroup"/>
+                    </m:oMathParaPr>
+                    <m:oMath xmlns:m="http://schemas.openxmlformats.org/officeDocument/2006/math">
+                      <m:sSup>
+                        <m:sSupPr>
+                          <m:ctrlPr>
+                            <a:rPr lang="en-US" sz="2400" i="1" smtClean="0">
+                              <a:latin typeface="Cambria Math" panose="02040503050406030204" pitchFamily="18" charset="0"/>
+                            </a:rPr>
+                          </m:ctrlPr>
+                        </m:sSupPr>
+                        <m:e>
+                          <m:r>
+                            <a:rPr lang="en-US" sz="2400" b="0" i="1" smtClean="0">
+                              <a:latin typeface="Cambria Math" panose="02040503050406030204" pitchFamily="18" charset="0"/>
+                            </a:rPr>
+                            <m:t>2</m:t>
+                          </m:r>
+                        </m:e>
+                        <m:sup>
+                          <m:nary>
+                            <m:naryPr>
+                              <m:chr m:val="∑"/>
+                              <m:ctrlPr>
+                                <a:rPr lang="en-US" sz="2400" i="1" smtClean="0">
+                                  <a:latin typeface="Cambria Math" panose="02040503050406030204" pitchFamily="18" charset="0"/>
+                                </a:rPr>
+                              </m:ctrlPr>
+                            </m:naryPr>
+                            <m:sub>
+                              <m:r>
+                                <m:rPr>
+                                  <m:brk m:alnAt="23"/>
+                                </m:rPr>
+                                <a:rPr lang="en-US" sz="2400" b="0" i="1" smtClean="0">
+                                  <a:latin typeface="Cambria Math" panose="02040503050406030204" pitchFamily="18" charset="0"/>
+                                </a:rPr>
+                                <m:t>𝑖</m:t>
+                              </m:r>
+                              <m:r>
+                                <a:rPr lang="en-US" sz="2400" b="0" i="1" smtClean="0">
+                                  <a:latin typeface="Cambria Math" panose="02040503050406030204" pitchFamily="18" charset="0"/>
+                                </a:rPr>
+                                <m:t>=</m:t>
+                              </m:r>
+                              <m:r>
+                                <m:rPr>
+                                  <m:brk m:alnAt="23"/>
+                                </m:rPr>
+                                <a:rPr lang="en-US" sz="2400" b="0" i="1" smtClean="0">
+                                  <a:latin typeface="Cambria Math" panose="02040503050406030204" pitchFamily="18" charset="0"/>
+                                </a:rPr>
+                                <m:t>1</m:t>
+                              </m:r>
+                            </m:sub>
+                            <m:sup>
+                              <m:r>
+                                <a:rPr lang="en-US" sz="2400" b="0" i="1" smtClean="0">
+                                  <a:latin typeface="Cambria Math" panose="02040503050406030204" pitchFamily="18" charset="0"/>
+                                </a:rPr>
+                                <m:t>𝑚</m:t>
+                              </m:r>
+                            </m:sup>
+                            <m:e>
+                              <m:sSub>
+                                <m:sSubPr>
+                                  <m:ctrlPr>
+                                    <a:rPr lang="en-US" sz="2400" i="1" smtClean="0">
+                                      <a:latin typeface="Cambria Math" panose="02040503050406030204" pitchFamily="18" charset="0"/>
+                                    </a:rPr>
+                                  </m:ctrlPr>
+                                </m:sSubPr>
+                                <m:e>
+                                  <m:r>
+                                    <a:rPr lang="en-US" sz="2400" b="0" i="1" smtClean="0">
+                                      <a:latin typeface="Cambria Math" panose="02040503050406030204" pitchFamily="18" charset="0"/>
+                                    </a:rPr>
+                                    <m:t>𝑛</m:t>
+                                  </m:r>
+                                </m:e>
+                                <m:sub>
+                                  <m:r>
+                                    <a:rPr lang="en-US" sz="2400" b="0" i="1" smtClean="0">
+                                      <a:latin typeface="Cambria Math" panose="02040503050406030204" pitchFamily="18" charset="0"/>
+                                    </a:rPr>
+                                    <m:t>𝑖</m:t>
+                                  </m:r>
+                                </m:sub>
+                              </m:sSub>
+                            </m:e>
+                          </m:nary>
+                        </m:sup>
+                      </m:sSup>
+                    </m:oMath>
+                  </m:oMathPara>
+                </a14:m>
+                <a:endParaRPr lang="en-US" sz="2400" dirty="0"/>
+              </a:p>
+              <a:p>
+                <a:pPr marL="146050" indent="0">
+                  <a:buNone/>
+                </a:pPr>
+                <a:r>
+                  <a:rPr lang="en-US" sz="1600" dirty="0" err="1"/>
+                  <a:t>Với</a:t>
+                </a:r>
+                <a:r>
+                  <a:rPr lang="en-US" sz="1600" dirty="0"/>
+                  <a:t> : </a:t>
+                </a:r>
+              </a:p>
+              <a:p>
+                <a:pPr marL="146050" indent="0">
+                  <a:buNone/>
+                </a:pPr>
+                <a:r>
+                  <a:rPr lang="en-US" sz="1600" dirty="0"/>
+                  <a:t>+ m </a:t>
+                </a:r>
+                <a:r>
+                  <a:rPr lang="en-US" sz="1600" dirty="0" err="1"/>
+                  <a:t>là</a:t>
+                </a:r>
+                <a:r>
+                  <a:rPr lang="en-US" sz="1600" dirty="0"/>
+                  <a:t> </a:t>
+                </a:r>
+                <a:r>
+                  <a:rPr lang="en-US" sz="1600" dirty="0" err="1"/>
+                  <a:t>số</a:t>
+                </a:r>
+                <a:r>
+                  <a:rPr lang="en-US" sz="1600" dirty="0"/>
+                  <a:t> l</a:t>
+                </a:r>
+                <a:r>
+                  <a:rPr lang="vi-VN" sz="1600" dirty="0"/>
+                  <a:t>ư</a:t>
+                </a:r>
+                <a:r>
+                  <a:rPr lang="en-US" sz="1600" dirty="0" err="1"/>
+                  <a:t>ợng</a:t>
+                </a:r>
+                <a:r>
+                  <a:rPr lang="en-US" sz="1600" dirty="0"/>
+                  <a:t> transaction </a:t>
+                </a:r>
+              </a:p>
+              <a:p>
+                <a:pPr marL="146050" indent="0">
+                  <a:buNone/>
+                </a:pPr>
+                <a:r>
+                  <a:rPr lang="en-US" sz="1600" dirty="0"/>
+                  <a:t>+ n </a:t>
+                </a:r>
+                <a:r>
+                  <a:rPr lang="en-US" sz="1600" dirty="0" err="1"/>
+                  <a:t>là</a:t>
+                </a:r>
+                <a:r>
+                  <a:rPr lang="en-US" sz="1600" dirty="0"/>
+                  <a:t> </a:t>
+                </a:r>
+                <a:r>
+                  <a:rPr lang="en-US" sz="1600" dirty="0" err="1"/>
+                  <a:t>số</a:t>
+                </a:r>
+                <a:r>
+                  <a:rPr lang="en-US" sz="1600" dirty="0"/>
+                  <a:t> l</a:t>
+                </a:r>
+                <a:r>
+                  <a:rPr lang="vi-VN" sz="1600" dirty="0"/>
+                  <a:t>ư</a:t>
+                </a:r>
+                <a:r>
+                  <a:rPr lang="en-US" sz="1600" dirty="0" err="1"/>
+                  <a:t>ợng</a:t>
+                </a:r>
+                <a:r>
+                  <a:rPr lang="en-US" sz="1600" dirty="0"/>
+                  <a:t> itemset </a:t>
+                </a:r>
+                <a:r>
+                  <a:rPr lang="en-US" sz="1600" dirty="0" err="1"/>
+                  <a:t>trong</a:t>
+                </a:r>
+                <a:r>
+                  <a:rPr lang="en-US" sz="1600" dirty="0"/>
+                  <a:t> </a:t>
+                </a:r>
+                <a:r>
+                  <a:rPr lang="en-US" sz="1600" dirty="0" err="1"/>
+                  <a:t>mỗi</a:t>
+                </a:r>
+                <a:r>
+                  <a:rPr lang="en-US" sz="1600" dirty="0"/>
+                  <a:t> transaction </a:t>
+                </a:r>
+              </a:p>
+              <a:p>
+                <a:pPr marL="146050" indent="0">
+                  <a:buNone/>
+                </a:pPr>
+                <a:r>
+                  <a:rPr lang="en-US" sz="1600" dirty="0" err="1"/>
+                  <a:t>Ví</a:t>
+                </a:r>
+                <a:r>
+                  <a:rPr lang="en-US" sz="1600" dirty="0"/>
+                  <a:t> </a:t>
+                </a:r>
+                <a:r>
+                  <a:rPr lang="en-US" sz="1600" dirty="0" err="1"/>
+                  <a:t>dụ</a:t>
+                </a:r>
+                <a:r>
+                  <a:rPr lang="en-US" sz="1600" dirty="0"/>
+                  <a:t>: </a:t>
+                </a:r>
+                <a:r>
+                  <a:rPr lang="en-US" sz="1600" dirty="0" err="1"/>
+                  <a:t>Số</a:t>
+                </a:r>
+                <a:r>
+                  <a:rPr lang="en-US" sz="1600" dirty="0"/>
+                  <a:t> </a:t>
+                </a:r>
+                <a:r>
+                  <a:rPr lang="en-US" sz="1600" dirty="0" err="1"/>
+                  <a:t>phần</a:t>
+                </a:r>
+                <a:r>
+                  <a:rPr lang="en-US" sz="1600" dirty="0"/>
+                  <a:t> </a:t>
+                </a:r>
+                <a:r>
+                  <a:rPr lang="en-US" sz="1600" dirty="0" err="1"/>
+                  <a:t>tử</a:t>
+                </a:r>
+                <a:r>
+                  <a:rPr lang="en-US" sz="1600" dirty="0"/>
+                  <a:t> </a:t>
+                </a:r>
+                <a:r>
+                  <a:rPr lang="en-US" sz="1600" dirty="0" err="1"/>
+                  <a:t>trong</a:t>
+                </a:r>
+                <a:r>
+                  <a:rPr lang="en-US" sz="1600" dirty="0"/>
+                  <a:t> possible </a:t>
+                </a:r>
+                <a:r>
+                  <a:rPr lang="en-US" sz="1600" dirty="0" err="1"/>
+                  <a:t>trong</a:t>
+                </a:r>
+                <a:r>
+                  <a:rPr lang="en-US" sz="1600" dirty="0"/>
+                  <a:t> </a:t>
+                </a:r>
+                <a:r>
+                  <a:rPr lang="en-US" sz="1600" dirty="0" err="1"/>
+                  <a:t>ví</a:t>
+                </a:r>
+                <a:r>
+                  <a:rPr lang="en-US" sz="1600" dirty="0"/>
+                  <a:t> </a:t>
+                </a:r>
+                <a:r>
+                  <a:rPr lang="en-US" sz="1600" dirty="0" err="1"/>
+                  <a:t>dụ</a:t>
+                </a:r>
+                <a:r>
+                  <a:rPr lang="en-US" sz="1600" dirty="0"/>
+                  <a:t> </a:t>
+                </a:r>
+                <a:r>
+                  <a:rPr lang="en-US" sz="1600" dirty="0" err="1"/>
+                  <a:t>trên</a:t>
+                </a:r>
+                <a:r>
+                  <a:rPr lang="en-US" sz="1600" dirty="0"/>
+                  <a:t> </a:t>
+                </a:r>
+                <a:r>
+                  <a:rPr lang="en-US" sz="1600" dirty="0" err="1"/>
+                  <a:t>là</a:t>
+                </a:r>
+                <a:r>
+                  <a:rPr lang="en-US" sz="1600" dirty="0"/>
+                  <a:t> </a:t>
+                </a:r>
+                <a14:m>
+                  <m:oMath xmlns:m="http://schemas.openxmlformats.org/officeDocument/2006/math">
+                    <m:sSup>
+                      <m:sSupPr>
+                        <m:ctrlPr>
+                          <a:rPr lang="en-US" sz="1600" i="1" smtClean="0">
+                            <a:latin typeface="Cambria Math" panose="02040503050406030204" pitchFamily="18" charset="0"/>
+                          </a:rPr>
+                        </m:ctrlPr>
+                      </m:sSupPr>
+                      <m:e>
+                        <m:r>
+                          <a:rPr lang="en-US" sz="1600" b="0" i="1" smtClean="0">
+                            <a:latin typeface="Cambria Math" panose="02040503050406030204" pitchFamily="18" charset="0"/>
+                          </a:rPr>
+                          <m:t>2</m:t>
+                        </m:r>
+                      </m:e>
+                      <m:sup>
+                        <m:r>
+                          <a:rPr lang="en-US" sz="1600" b="0" i="1" smtClean="0">
+                            <a:latin typeface="Cambria Math" panose="02040503050406030204" pitchFamily="18" charset="0"/>
+                          </a:rPr>
+                          <m:t>2</m:t>
+                        </m:r>
+                        <m:r>
+                          <a:rPr lang="en-US" sz="1600" b="0" i="1" smtClean="0">
+                            <a:latin typeface="Cambria Math" panose="02040503050406030204" pitchFamily="18" charset="0"/>
+                          </a:rPr>
+                          <m:t>+</m:t>
+                        </m:r>
+                        <m:r>
+                          <a:rPr lang="en-US" sz="1600" b="0" i="1" smtClean="0">
+                            <a:latin typeface="Cambria Math" panose="02040503050406030204" pitchFamily="18" charset="0"/>
+                          </a:rPr>
+                          <m:t>2</m:t>
+                        </m:r>
+                      </m:sup>
+                    </m:sSup>
+                    <m:r>
+                      <a:rPr lang="en-US" sz="1600" b="0" i="1" smtClean="0">
+                        <a:latin typeface="Cambria Math" panose="02040503050406030204" pitchFamily="18" charset="0"/>
+                      </a:rPr>
+                      <m:t>=</m:t>
+                    </m:r>
+                    <m:r>
+                      <a:rPr lang="en-US" sz="1600" b="0" i="1" smtClean="0">
+                        <a:latin typeface="Cambria Math" panose="02040503050406030204" pitchFamily="18" charset="0"/>
+                      </a:rPr>
+                      <m:t>16</m:t>
+                    </m:r>
+                  </m:oMath>
+                </a14:m>
+                <a:r>
+                  <a:rPr lang="en-US" sz="1600" dirty="0"/>
+                  <a:t> </a:t>
+                </a:r>
+                <a:r>
+                  <a:rPr lang="en-US" sz="1600" dirty="0" err="1"/>
+                  <a:t>phần</a:t>
+                </a:r>
+                <a:r>
+                  <a:rPr lang="en-US" sz="1600" dirty="0"/>
+                  <a:t> </a:t>
+                </a:r>
+                <a:r>
+                  <a:rPr lang="en-US" sz="1600" dirty="0" err="1"/>
+                  <a:t>tử</a:t>
+                </a:r>
+                <a:r>
+                  <a:rPr lang="en-US" sz="1600" dirty="0"/>
+                  <a:t>.</a:t>
+                </a:r>
+              </a:p>
+            </p:txBody>
+          </p:sp>
+        </mc:Choice>
+        <mc:Fallback>
+          <p:sp>
+            <p:nvSpPr>
+              <p:cNvPr id="3" name="Text Placeholder 2">
+                <a:extLst>
+                  <a:ext uri="{FF2B5EF4-FFF2-40B4-BE49-F238E27FC236}">
+                    <a16:creationId xmlns:a16="http://schemas.microsoft.com/office/drawing/2014/main" id="{A71A36F2-7744-417A-9062-D2DAFFD98645}"/>
+                  </a:ext>
+                </a:extLst>
+              </p:cNvPr>
+              <p:cNvSpPr>
+                <a:spLocks noGrp="1" noRot="1" noChangeAspect="1" noMove="1" noResize="1" noEditPoints="1" noAdjustHandles="1" noChangeArrowheads="1" noChangeShapeType="1" noTextEdit="1"/>
+              </p:cNvSpPr>
+              <p:nvPr>
+                <p:ph type="body" idx="1"/>
+              </p:nvPr>
+            </p:nvSpPr>
+            <p:spPr>
+              <a:blipFill>
+                <a:blip r:embed="rId2"/>
+                <a:stretch>
+                  <a:fillRect/>
+                </a:stretch>
+              </a:blipFill>
+            </p:spPr>
+            <p:txBody>
+              <a:bodyPr/>
+              <a:lstStyle/>
+              <a:p>
+                <a:r>
+                  <a:rPr lang="en-US">
+                    <a:noFill/>
+                  </a:rPr>
+                  <a:t> </a:t>
+                </a:r>
+              </a:p>
+            </p:txBody>
+          </p:sp>
+        </mc:Fallback>
+      </mc:AlternateContent>
+    </p:spTree>
+    <p:extLst>
+      <p:ext uri="{BB962C8B-B14F-4D97-AF65-F5344CB8AC3E}">
+        <p14:creationId xmlns:p14="http://schemas.microsoft.com/office/powerpoint/2010/main" val="2510644558"/>
+      </p:ext>
+    </p:extLst>
+  </p:cSld>
+  <p:clrMapOvr>
+    <a:masterClrMapping/>
+  </p:clrMapOvr>
+</p:sld>
+</file>
+
+<file path=ppt/slides/slide16.xml><?xml version="1.0" encoding="utf-8"?>
+<p:sld xmlns:a="http://schemas.openxmlformats.org/drawingml/2006/main" xmlns:r="http://schemas.openxmlformats.org/officeDocument/2006/relationships" xmlns:p="http://schemas.openxmlformats.org/presentationml/2006/main">
+  <p:cSld>
+    <p:spTree>
+      <p:nvGrpSpPr>
         <p:cNvPr id="1" name="Shape 330"/>
         <p:cNvGrpSpPr/>
         <p:nvPr/>
@@ -19509,7 +20106,11 @@
               </a:spcAft>
               <a:buNone/>
             </a:pPr>
-            <a:endParaRPr/>
+            <a:r>
+              <a:rPr lang="en-US" dirty="0"/>
+              <a:t>Code</a:t>
+            </a:r>
+            <a:endParaRPr dirty="0"/>
           </a:p>
         </p:txBody>
       </p:sp>
@@ -19551,7 +20152,188 @@
           </a:p>
         </p:txBody>
       </p:sp>
+      <p:pic>
+        <p:nvPicPr>
+          <p:cNvPr id="2" name="Picture 1">
+            <a:extLst>
+              <a:ext uri="{FF2B5EF4-FFF2-40B4-BE49-F238E27FC236}">
+                <a16:creationId xmlns:a16="http://schemas.microsoft.com/office/drawing/2014/main" id="{FD90B93D-E7EF-4484-BB14-9B4E574797C6}"/>
+              </a:ext>
+            </a:extLst>
+          </p:cNvPr>
+          <p:cNvPicPr>
+            <a:picLocks noChangeAspect="1"/>
+          </p:cNvPicPr>
+          <p:nvPr/>
+        </p:nvPicPr>
+        <p:blipFill>
+          <a:blip r:embed="rId3"/>
+          <a:stretch>
+            <a:fillRect/>
+          </a:stretch>
+        </p:blipFill>
+        <p:spPr>
+          <a:xfrm>
+            <a:off x="707821" y="2142232"/>
+            <a:ext cx="7880255" cy="615256"/>
+          </a:xfrm>
+          <a:prstGeom prst="rect">
+            <a:avLst/>
+          </a:prstGeom>
+        </p:spPr>
+      </p:pic>
     </p:spTree>
+  </p:cSld>
+  <p:clrMapOvr>
+    <a:masterClrMapping/>
+  </p:clrMapOvr>
+</p:sld>
+</file>
+
+<file path=ppt/slides/slide17.xml><?xml version="1.0" encoding="utf-8"?>
+<p:sld xmlns:a="http://schemas.openxmlformats.org/drawingml/2006/main" xmlns:r="http://schemas.openxmlformats.org/officeDocument/2006/relationships" xmlns:p="http://schemas.openxmlformats.org/presentationml/2006/main">
+  <p:cSld>
+    <p:spTree>
+      <p:nvGrpSpPr>
+        <p:cNvPr id="1" name=""/>
+        <p:cNvGrpSpPr/>
+        <p:nvPr/>
+      </p:nvGrpSpPr>
+      <p:grpSpPr>
+        <a:xfrm>
+          <a:off x="0" y="0"/>
+          <a:ext cx="0" cy="0"/>
+          <a:chOff x="0" y="0"/>
+          <a:chExt cx="0" cy="0"/>
+        </a:xfrm>
+      </p:grpSpPr>
+      <p:sp>
+        <p:nvSpPr>
+          <p:cNvPr id="2" name="Title 1">
+            <a:extLst>
+              <a:ext uri="{FF2B5EF4-FFF2-40B4-BE49-F238E27FC236}">
+                <a16:creationId xmlns:a16="http://schemas.microsoft.com/office/drawing/2014/main" id="{6C59DC95-EEDF-49EC-85A5-36E2DA50A11A}"/>
+              </a:ext>
+            </a:extLst>
+          </p:cNvPr>
+          <p:cNvSpPr>
+            <a:spLocks noGrp="1"/>
+          </p:cNvSpPr>
+          <p:nvPr>
+            <p:ph type="title"/>
+          </p:nvPr>
+        </p:nvSpPr>
+        <p:spPr/>
+        <p:txBody>
+          <a:bodyPr/>
+          <a:lstStyle/>
+          <a:p>
+            <a:r>
+              <a:rPr lang="en-US" dirty="0"/>
+              <a:t>Code (</a:t>
+            </a:r>
+            <a:r>
+              <a:rPr lang="en-US" dirty="0" err="1"/>
+              <a:t>tt</a:t>
+            </a:r>
+            <a:r>
+              <a:rPr lang="en-US" dirty="0"/>
+              <a:t>)</a:t>
+            </a:r>
+          </a:p>
+        </p:txBody>
+      </p:sp>
+      <p:sp>
+        <p:nvSpPr>
+          <p:cNvPr id="3" name="Text Placeholder 2">
+            <a:extLst>
+              <a:ext uri="{FF2B5EF4-FFF2-40B4-BE49-F238E27FC236}">
+                <a16:creationId xmlns:a16="http://schemas.microsoft.com/office/drawing/2014/main" id="{0B578542-74F0-4B2E-97CB-677ED97500D4}"/>
+              </a:ext>
+            </a:extLst>
+          </p:cNvPr>
+          <p:cNvSpPr>
+            <a:spLocks noGrp="1"/>
+          </p:cNvSpPr>
+          <p:nvPr>
+            <p:ph type="body" idx="1"/>
+          </p:nvPr>
+        </p:nvSpPr>
+        <p:spPr/>
+        <p:txBody>
+          <a:bodyPr/>
+          <a:lstStyle/>
+          <a:p>
+            <a:endParaRPr lang="en-US"/>
+          </a:p>
+        </p:txBody>
+      </p:sp>
+      <p:pic>
+        <p:nvPicPr>
+          <p:cNvPr id="5" name="Picture 4">
+            <a:extLst>
+              <a:ext uri="{FF2B5EF4-FFF2-40B4-BE49-F238E27FC236}">
+                <a16:creationId xmlns:a16="http://schemas.microsoft.com/office/drawing/2014/main" id="{393C78B4-531C-45BA-A8B2-7A8E5F71C24C}"/>
+              </a:ext>
+            </a:extLst>
+          </p:cNvPr>
+          <p:cNvPicPr>
+            <a:picLocks noChangeAspect="1"/>
+          </p:cNvPicPr>
+          <p:nvPr/>
+        </p:nvPicPr>
+        <p:blipFill>
+          <a:blip r:embed="rId2"/>
+          <a:stretch>
+            <a:fillRect/>
+          </a:stretch>
+        </p:blipFill>
+        <p:spPr>
+          <a:xfrm>
+            <a:off x="357188" y="1663053"/>
+            <a:ext cx="3839439" cy="2344247"/>
+          </a:xfrm>
+          <a:prstGeom prst="rect">
+            <a:avLst/>
+          </a:prstGeom>
+        </p:spPr>
+      </p:pic>
+      <p:pic>
+        <p:nvPicPr>
+          <p:cNvPr id="6" name="Picture 5">
+            <a:extLst>
+              <a:ext uri="{FF2B5EF4-FFF2-40B4-BE49-F238E27FC236}">
+                <a16:creationId xmlns:a16="http://schemas.microsoft.com/office/drawing/2014/main" id="{72E3F3DF-C977-4E8D-A95C-02C332484C72}"/>
+              </a:ext>
+            </a:extLst>
+          </p:cNvPr>
+          <p:cNvPicPr>
+            <a:picLocks noChangeAspect="1"/>
+          </p:cNvPicPr>
+          <p:nvPr/>
+        </p:nvPicPr>
+        <p:blipFill>
+          <a:blip r:embed="rId3"/>
+          <a:stretch>
+            <a:fillRect/>
+          </a:stretch>
+        </p:blipFill>
+        <p:spPr>
+          <a:xfrm>
+            <a:off x="4536281" y="850871"/>
+            <a:ext cx="4038950" cy="3680779"/>
+          </a:xfrm>
+          <a:prstGeom prst="rect">
+            <a:avLst/>
+          </a:prstGeom>
+        </p:spPr>
+      </p:pic>
+    </p:spTree>
+    <p:extLst>
+      <p:ext uri="{BB962C8B-B14F-4D97-AF65-F5344CB8AC3E}">
+        <p14:creationId xmlns:p14="http://schemas.microsoft.com/office/powerpoint/2010/main" val="3482601840"/>
+      </p:ext>
+    </p:extLst>
   </p:cSld>
   <p:clrMapOvr>
     <a:masterClrMapping/>
@@ -20131,8 +20913,8 @@
           </a:p>
         </p:txBody>
       </p:sp>
-      <mc:AlternateContent xmlns:mc="http://schemas.openxmlformats.org/markup-compatibility/2006">
-        <mc:Choice xmlns:a14="http://schemas.microsoft.com/office/drawing/2010/main" Requires="a14">
+      <mc:AlternateContent xmlns:mc="http://schemas.openxmlformats.org/markup-compatibility/2006" xmlns:a14="http://schemas.microsoft.com/office/drawing/2010/main">
+        <mc:Choice Requires="a14">
           <p:sp>
             <p:nvSpPr>
               <p:cNvPr id="302" name="Google Shape;302;p17"/>
@@ -20290,7 +21072,7 @@
             </p:txBody>
           </p:sp>
         </mc:Choice>
-        <mc:Fallback>
+        <mc:Fallback xmlns="">
           <p:sp>
             <p:nvSpPr>
               <p:cNvPr id="302" name="Google Shape;302;p17"/>
@@ -20790,8 +21572,8 @@
           </a:p>
         </p:txBody>
       </p:sp>
-      <mc:AlternateContent xmlns:mc="http://schemas.openxmlformats.org/markup-compatibility/2006">
-        <mc:Choice xmlns:a14="http://schemas.microsoft.com/office/drawing/2010/main" Requires="a14">
+      <mc:AlternateContent xmlns:mc="http://schemas.openxmlformats.org/markup-compatibility/2006" xmlns:a14="http://schemas.microsoft.com/office/drawing/2010/main">
+        <mc:Choice Requires="a14">
           <p:sp>
             <p:nvSpPr>
               <p:cNvPr id="3" name="Text Placeholder 2">
@@ -21120,7 +21902,7 @@
             </p:txBody>
           </p:sp>
         </mc:Choice>
-        <mc:Fallback>
+        <mc:Fallback xmlns="">
           <p:sp>
             <p:nvSpPr>
               <p:cNvPr id="3" name="Text Placeholder 2">

</xml_diff>

<commit_message>
add representation week 2
</commit_message>
<xml_diff>
--- a/Silde Bao cao/Tuần 1.pptx
+++ b/Silde Bao cao/Tuần 1.pptx
@@ -972,7 +972,7 @@
         </p:nvSpPr>
         <p:spPr>
           <a:xfrm>
-            <a:off x="381300" y="685800"/>
+            <a:off x="381000" y="685800"/>
             <a:ext cx="6096000" cy="3429000"/>
           </a:xfrm>
           <a:custGeom>
@@ -1184,7 +1184,7 @@
         </p:nvSpPr>
         <p:spPr>
           <a:xfrm>
-            <a:off x="381300" y="685800"/>
+            <a:off x="381000" y="685800"/>
             <a:ext cx="6096000" cy="3429000"/>
           </a:xfrm>
           <a:custGeom>
@@ -18127,8 +18127,8 @@
           </a:p>
         </p:txBody>
       </p:sp>
-      <mc:AlternateContent xmlns:mc="http://schemas.openxmlformats.org/markup-compatibility/2006" xmlns:a14="http://schemas.microsoft.com/office/drawing/2010/main">
-        <mc:Choice Requires="a14">
+      <mc:AlternateContent xmlns:mc="http://schemas.openxmlformats.org/markup-compatibility/2006">
+        <mc:Choice xmlns:a14="http://schemas.microsoft.com/office/drawing/2010/main" Requires="a14">
           <p:sp>
             <p:nvSpPr>
               <p:cNvPr id="314" name="Google Shape;314;p19"/>
@@ -18166,7 +18166,19 @@
                 </a:r>
                 <a:r>
                   <a:rPr lang="vi-VN" sz="1600" dirty="0"/>
-                  <a:t> PW được chuyển đổi </a:t>
+                  <a:t> PW được chuyển đổi</a:t>
+                </a:r>
+                <a:r>
+                  <a:rPr lang="en-US" sz="1600" dirty="0"/>
+                  <a:t> </a:t>
+                </a:r>
+                <a:r>
+                  <a:rPr lang="en-US" sz="1600" dirty="0" err="1"/>
+                  <a:t>từ</a:t>
+                </a:r>
+                <a:r>
+                  <a:rPr lang="vi-VN" sz="1600" dirty="0"/>
+                  <a:t> </a:t>
                 </a:r>
                 <a:r>
                   <a:rPr lang="en-US" sz="1600" dirty="0"/>
@@ -18546,7 +18558,7 @@
             </p:txBody>
           </p:sp>
         </mc:Choice>
-        <mc:Fallback xmlns="">
+        <mc:Fallback>
           <p:sp>
             <p:nvSpPr>
               <p:cNvPr id="314" name="Google Shape;314;p19"/>
@@ -18568,7 +18580,7 @@
               <a:blipFill>
                 <a:blip r:embed="rId3"/>
                 <a:stretch>
-                  <a:fillRect l="-520"/>
+                  <a:fillRect l="-520" r="-87"/>
                 </a:stretch>
               </a:blipFill>
             </p:spPr>
@@ -19424,7 +19436,7 @@
         </p:spPr>
         <p:txBody>
           <a:bodyPr spcFirstLastPara="1" wrap="square" lIns="91425" tIns="91425" rIns="91425" bIns="91425" anchor="t" anchorCtr="0">
-            <a:normAutofit/>
+            <a:normAutofit fontScale="92500" lnSpcReduction="20000"/>
           </a:bodyPr>
           <a:lstStyle/>
           <a:p>
@@ -19437,7 +19449,86 @@
               </a:spcAft>
               <a:buNone/>
             </a:pPr>
-            <a:endParaRPr/>
+            <a:endParaRPr lang="en-US" dirty="0"/>
+          </a:p>
+          <a:p>
+            <a:pPr marL="0" lvl="0" indent="0" algn="l" rtl="0">
+              <a:spcBef>
+                <a:spcPts val="0"/>
+              </a:spcBef>
+              <a:spcAft>
+                <a:spcPts val="1200"/>
+              </a:spcAft>
+              <a:buNone/>
+            </a:pPr>
+            <a:endParaRPr lang="en-US" dirty="0"/>
+          </a:p>
+          <a:p>
+            <a:pPr marL="0" lvl="0" indent="0" algn="l" rtl="0">
+              <a:spcBef>
+                <a:spcPts val="0"/>
+              </a:spcBef>
+              <a:spcAft>
+                <a:spcPts val="1200"/>
+              </a:spcAft>
+              <a:buNone/>
+            </a:pPr>
+            <a:endParaRPr lang="en-US" dirty="0"/>
+          </a:p>
+          <a:p>
+            <a:pPr marL="0" lvl="0" indent="0" algn="l" rtl="0">
+              <a:spcBef>
+                <a:spcPts val="0"/>
+              </a:spcBef>
+              <a:spcAft>
+                <a:spcPts val="1200"/>
+              </a:spcAft>
+              <a:buNone/>
+            </a:pPr>
+            <a:endParaRPr lang="en-US" dirty="0"/>
+          </a:p>
+          <a:p>
+            <a:pPr marL="0" lvl="0" indent="0" algn="l" rtl="0">
+              <a:spcBef>
+                <a:spcPts val="0"/>
+              </a:spcBef>
+              <a:spcAft>
+                <a:spcPts val="1200"/>
+              </a:spcAft>
+              <a:buNone/>
+            </a:pPr>
+            <a:endParaRPr lang="en-US" dirty="0"/>
+          </a:p>
+          <a:p>
+            <a:pPr marL="0" lvl="0" indent="0" algn="l" rtl="0">
+              <a:spcBef>
+                <a:spcPts val="0"/>
+              </a:spcBef>
+              <a:spcAft>
+                <a:spcPts val="1200"/>
+              </a:spcAft>
+              <a:buNone/>
+            </a:pPr>
+            <a:r>
+              <a:rPr lang="en-US" dirty="0"/>
+              <a:t>p(PW6) = 0.6*0.3*0.2*0.7 = 0.0252</a:t>
+            </a:r>
+          </a:p>
+          <a:p>
+            <a:pPr marL="0" lvl="0" indent="0" algn="l" rtl="0">
+              <a:spcBef>
+                <a:spcPts val="0"/>
+              </a:spcBef>
+              <a:spcAft>
+                <a:spcPts val="1200"/>
+              </a:spcAft>
+              <a:buNone/>
+            </a:pPr>
+            <a:r>
+              <a:rPr lang="en-US" dirty="0"/>
+              <a:t>P(PW16) = (0.6*0.7)*(0.2*0.3) = 0.0252</a:t>
+            </a:r>
+            <a:endParaRPr dirty="0"/>
           </a:p>
         </p:txBody>
       </p:sp>
@@ -19463,8 +19554,38 @@
         </p:blipFill>
         <p:spPr>
           <a:xfrm>
-            <a:off x="140586" y="811377"/>
+            <a:off x="140586" y="118434"/>
             <a:ext cx="8862828" cy="3520745"/>
+          </a:xfrm>
+          <a:prstGeom prst="rect">
+            <a:avLst/>
+          </a:prstGeom>
+        </p:spPr>
+      </p:pic>
+      <p:pic>
+        <p:nvPicPr>
+          <p:cNvPr id="3" name="Picture 2">
+            <a:extLst>
+              <a:ext uri="{FF2B5EF4-FFF2-40B4-BE49-F238E27FC236}">
+                <a16:creationId xmlns:a16="http://schemas.microsoft.com/office/drawing/2014/main" id="{F0F7AF83-3F92-4DD5-BDD4-5F02CF45CDAB}"/>
+              </a:ext>
+            </a:extLst>
+          </p:cNvPr>
+          <p:cNvPicPr>
+            <a:picLocks noChangeAspect="1"/>
+          </p:cNvPicPr>
+          <p:nvPr/>
+        </p:nvPicPr>
+        <p:blipFill>
+          <a:blip r:embed="rId4"/>
+          <a:stretch>
+            <a:fillRect/>
+          </a:stretch>
+        </p:blipFill>
+        <p:spPr>
+          <a:xfrm>
+            <a:off x="4572000" y="3639179"/>
+            <a:ext cx="3863675" cy="1143099"/>
           </a:xfrm>
           <a:prstGeom prst="rect">
             <a:avLst/>
@@ -19536,8 +19657,8 @@
           </a:p>
         </p:txBody>
       </p:sp>
-      <mc:AlternateContent xmlns:mc="http://schemas.openxmlformats.org/markup-compatibility/2006">
-        <mc:Choice xmlns:a14="http://schemas.microsoft.com/office/drawing/2010/main" Requires="a14">
+      <mc:AlternateContent xmlns:mc="http://schemas.openxmlformats.org/markup-compatibility/2006" xmlns:a14="http://schemas.microsoft.com/office/drawing/2010/main">
+        <mc:Choice Requires="a14">
           <p:sp>
             <p:nvSpPr>
               <p:cNvPr id="3" name="Text Placeholder 2">
@@ -19948,19 +20069,7 @@
                           <a:rPr lang="en-US" sz="1600" b="0" i="1" smtClean="0">
                             <a:latin typeface="Cambria Math" panose="02040503050406030204" pitchFamily="18" charset="0"/>
                           </a:rPr>
-                          <m:t>2</m:t>
-                        </m:r>
-                        <m:r>
-                          <a:rPr lang="en-US" sz="1600" b="0" i="1" smtClean="0">
-                            <a:latin typeface="Cambria Math" panose="02040503050406030204" pitchFamily="18" charset="0"/>
-                          </a:rPr>
-                          <m:t>+</m:t>
-                        </m:r>
-                        <m:r>
-                          <a:rPr lang="en-US" sz="1600" b="0" i="1" smtClean="0">
-                            <a:latin typeface="Cambria Math" panose="02040503050406030204" pitchFamily="18" charset="0"/>
-                          </a:rPr>
-                          <m:t>2</m:t>
+                          <m:t>2+2</m:t>
                         </m:r>
                       </m:sup>
                     </m:sSup>
@@ -19968,13 +20077,7 @@
                       <a:rPr lang="en-US" sz="1600" b="0" i="1" smtClean="0">
                         <a:latin typeface="Cambria Math" panose="02040503050406030204" pitchFamily="18" charset="0"/>
                       </a:rPr>
-                      <m:t>=</m:t>
-                    </m:r>
-                    <m:r>
-                      <a:rPr lang="en-US" sz="1600" b="0" i="1" smtClean="0">
-                        <a:latin typeface="Cambria Math" panose="02040503050406030204" pitchFamily="18" charset="0"/>
-                      </a:rPr>
-                      <m:t>16</m:t>
+                      <m:t>=16</m:t>
                     </m:r>
                   </m:oMath>
                 </a14:m>
@@ -20002,7 +20105,7 @@
             </p:txBody>
           </p:sp>
         </mc:Choice>
-        <mc:Fallback>
+        <mc:Fallback xmlns="">
           <p:sp>
             <p:nvSpPr>
               <p:cNvPr id="3" name="Text Placeholder 2">
@@ -20438,10 +20541,10 @@
               <a:buNone/>
             </a:pPr>
             <a:r>
-              <a:rPr lang="vi" sz="1600"/>
+              <a:rPr lang="vi" sz="1600" dirty="0"/>
               <a:t>Tìm hiểu uncertain data</a:t>
             </a:r>
-            <a:endParaRPr sz="1600"/>
+            <a:endParaRPr sz="1600" dirty="0"/>
           </a:p>
           <a:p>
             <a:pPr marL="0" lvl="0" indent="0" algn="l" rtl="0">
@@ -20457,10 +20560,10 @@
               <a:buNone/>
             </a:pPr>
             <a:r>
-              <a:rPr lang="vi" sz="1600"/>
-              <a:t>Khai phá Probabilistic Maximal Frequent Itemsets</a:t>
+              <a:rPr lang="vi" sz="1600" dirty="0"/>
+              <a:t>Định nghĩa lại PMFI cho phù hợp với định nghĩa truyền thống</a:t>
             </a:r>
-            <a:endParaRPr sz="1600"/>
+            <a:endParaRPr sz="1600" dirty="0"/>
           </a:p>
           <a:p>
             <a:pPr marL="0" lvl="0" indent="0" algn="l" rtl="0">
@@ -20476,10 +20579,10 @@
               <a:buNone/>
             </a:pPr>
             <a:r>
-              <a:rPr lang="vi" sz="1600"/>
-              <a:t>Định nghĩa lại PMFI cho phù hợp với định nghĩa truyền thống</a:t>
+              <a:rPr lang="vi" sz="1600" dirty="0"/>
+              <a:t>Sử dụng PMFI tree để tổ chức và duy trì dữ liệu</a:t>
             </a:r>
-            <a:endParaRPr sz="1600"/>
+            <a:endParaRPr sz="1600" dirty="0"/>
           </a:p>
           <a:p>
             <a:pPr marL="0" lvl="0" indent="0" algn="l" rtl="0">
@@ -20495,10 +20598,42 @@
               <a:buNone/>
             </a:pPr>
             <a:r>
-              <a:rPr lang="vi" sz="1600"/>
-              <a:t>Sử dụng PMFI tree để tổ chức và duy trì dữ liệu</a:t>
+              <a:rPr lang="vi" sz="1600" dirty="0"/>
+              <a:t>Các chiến lược cắt tỉa để cải thiện hiệu suất</a:t>
             </a:r>
-            <a:endParaRPr sz="1600"/>
+            <a:endParaRPr lang="en-US" sz="1600" dirty="0"/>
+          </a:p>
+          <a:p>
+            <a:pPr marL="0" indent="0">
+              <a:lnSpc>
+                <a:spcPct val="95000"/>
+              </a:lnSpc>
+              <a:spcBef>
+                <a:spcPts val="1200"/>
+              </a:spcBef>
+              <a:buNone/>
+            </a:pPr>
+            <a:r>
+              <a:rPr lang="en-US" sz="1600" dirty="0" err="1"/>
+              <a:t>Khai</a:t>
+            </a:r>
+            <a:r>
+              <a:rPr lang="en-US" sz="1600" dirty="0"/>
+              <a:t> </a:t>
+            </a:r>
+            <a:r>
+              <a:rPr lang="en-US" sz="1600" dirty="0" err="1"/>
+              <a:t>phá</a:t>
+            </a:r>
+            <a:r>
+              <a:rPr lang="en-US" sz="1600" dirty="0"/>
+              <a:t> Probabilistic Maximal Frequent </a:t>
+            </a:r>
+            <a:r>
+              <a:rPr lang="en-US" sz="1600" dirty="0" err="1"/>
+              <a:t>Itemsets</a:t>
+            </a:r>
+            <a:endParaRPr sz="1600" dirty="0"/>
           </a:p>
           <a:p>
             <a:pPr marL="0" lvl="0" indent="0" algn="l" rtl="0">
@@ -20514,10 +20649,10 @@
               <a:buNone/>
             </a:pPr>
             <a:r>
-              <a:rPr lang="vi" sz="1600"/>
-              <a:t>Các chiến lược cắt tỉa để cải thiện hiệu suất</a:t>
+              <a:rPr lang="vi" sz="1600" dirty="0"/>
+              <a:t>Tìm hiểu về approximate PMFI</a:t>
             </a:r>
-            <a:endParaRPr sz="1600"/>
+            <a:endParaRPr sz="1600" dirty="0"/>
           </a:p>
           <a:p>
             <a:pPr marL="0" lvl="0" indent="0" algn="l" rtl="0">
@@ -20528,34 +20663,15 @@
                 <a:spcPts val="1200"/>
               </a:spcBef>
               <a:spcAft>
-                <a:spcPts val="0"/>
+                <a:spcPts val="1200"/>
               </a:spcAft>
               <a:buNone/>
             </a:pPr>
             <a:r>
-              <a:rPr lang="vi" sz="1600"/>
-              <a:t>Tìm hiểu về approximate PMFI</a:t>
-            </a:r>
-            <a:endParaRPr sz="1600"/>
-          </a:p>
-          <a:p>
-            <a:pPr marL="0" lvl="0" indent="0" algn="l" rtl="0">
-              <a:lnSpc>
-                <a:spcPct val="95000"/>
-              </a:lnSpc>
-              <a:spcBef>
-                <a:spcPts val="1200"/>
-              </a:spcBef>
-              <a:spcAft>
-                <a:spcPts val="1200"/>
-              </a:spcAft>
-              <a:buNone/>
-            </a:pPr>
-            <a:r>
-              <a:rPr lang="vi" sz="1600"/>
+              <a:rPr lang="vi" sz="1600" dirty="0"/>
               <a:t>So sánh với thuật toán TODIS-MAX</a:t>
             </a:r>
-            <a:endParaRPr sz="1600"/>
+            <a:endParaRPr sz="1600" dirty="0"/>
           </a:p>
         </p:txBody>
       </p:sp>
@@ -20728,10 +20844,14 @@
               <a:buNone/>
             </a:pPr>
             <a:r>
-              <a:rPr lang="vi" sz="3200"/>
+              <a:rPr lang="vi" sz="3200" dirty="0"/>
               <a:t>Uncertain</a:t>
             </a:r>
-            <a:endParaRPr sz="3200"/>
+            <a:r>
+              <a:rPr lang="en-US" sz="3200" dirty="0"/>
+              <a:t>ty</a:t>
+            </a:r>
+            <a:endParaRPr sz="3200" dirty="0"/>
           </a:p>
         </p:txBody>
       </p:sp>

</xml_diff>